<commit_message>
Last version of ppt
</commit_message>
<xml_diff>
--- a/FireboxBenchmarks-retreat.pptx
+++ b/FireboxBenchmarks-retreat.pptx
@@ -4,10 +4,19 @@
   <p:sldMasterIdLst>
     <p:sldMasterId id="2147483648" r:id="rId1"/>
   </p:sldMasterIdLst>
+  <p:notesMasterIdLst>
+    <p:notesMasterId r:id="rId11"/>
+  </p:notesMasterIdLst>
   <p:sldIdLst>
     <p:sldId id="258" r:id="rId2"/>
-    <p:sldId id="256" r:id="rId3"/>
-    <p:sldId id="257" r:id="rId4"/>
+    <p:sldId id="261" r:id="rId3"/>
+    <p:sldId id="260" r:id="rId4"/>
+    <p:sldId id="259" r:id="rId5"/>
+    <p:sldId id="256" r:id="rId6"/>
+    <p:sldId id="264" r:id="rId7"/>
+    <p:sldId id="265" r:id="rId8"/>
+    <p:sldId id="257" r:id="rId9"/>
+    <p:sldId id="262" r:id="rId10"/>
   </p:sldIdLst>
   <p:sldSz cx="9144000" cy="6858000" type="screen4x3"/>
   <p:notesSz cx="6858000" cy="9144000"/>
@@ -109,6 +118,575 @@
 </p:presentation>
 </file>
 
+<file path=ppt/notesMasters/notesMaster1.xml><?xml version="1.0" encoding="utf-8"?>
+<p:notesMaster xmlns:a="http://schemas.openxmlformats.org/drawingml/2006/main" xmlns:r="http://schemas.openxmlformats.org/officeDocument/2006/relationships" xmlns:p="http://schemas.openxmlformats.org/presentationml/2006/main">
+  <p:cSld>
+    <p:bg>
+      <p:bgRef idx="1001">
+        <a:schemeClr val="bg1"/>
+      </p:bgRef>
+    </p:bg>
+    <p:spTree>
+      <p:nvGrpSpPr>
+        <p:cNvPr id="1" name=""/>
+        <p:cNvGrpSpPr/>
+        <p:nvPr/>
+      </p:nvGrpSpPr>
+      <p:grpSpPr>
+        <a:xfrm>
+          <a:off x="0" y="0"/>
+          <a:ext cx="0" cy="0"/>
+          <a:chOff x="0" y="0"/>
+          <a:chExt cx="0" cy="0"/>
+        </a:xfrm>
+      </p:grpSpPr>
+      <p:sp>
+        <p:nvSpPr>
+          <p:cNvPr id="2" name="Header Placeholder 1"/>
+          <p:cNvSpPr>
+            <a:spLocks noGrp="1"/>
+          </p:cNvSpPr>
+          <p:nvPr>
+            <p:ph type="hdr" sz="quarter"/>
+          </p:nvPr>
+        </p:nvSpPr>
+        <p:spPr>
+          <a:xfrm>
+            <a:off x="0" y="0"/>
+            <a:ext cx="2971800" cy="457200"/>
+          </a:xfrm>
+          <a:prstGeom prst="rect">
+            <a:avLst/>
+          </a:prstGeom>
+        </p:spPr>
+        <p:txBody>
+          <a:bodyPr vert="horz" lIns="91440" tIns="45720" rIns="91440" bIns="45720" rtlCol="0"/>
+          <a:lstStyle>
+            <a:lvl1pPr algn="l">
+              <a:defRPr sz="1200"/>
+            </a:lvl1pPr>
+          </a:lstStyle>
+          <a:p>
+            <a:endParaRPr lang="en-US"/>
+          </a:p>
+        </p:txBody>
+      </p:sp>
+      <p:sp>
+        <p:nvSpPr>
+          <p:cNvPr id="3" name="Date Placeholder 2"/>
+          <p:cNvSpPr>
+            <a:spLocks noGrp="1"/>
+          </p:cNvSpPr>
+          <p:nvPr>
+            <p:ph type="dt" idx="1"/>
+          </p:nvPr>
+        </p:nvSpPr>
+        <p:spPr>
+          <a:xfrm>
+            <a:off x="3884613" y="0"/>
+            <a:ext cx="2971800" cy="457200"/>
+          </a:xfrm>
+          <a:prstGeom prst="rect">
+            <a:avLst/>
+          </a:prstGeom>
+        </p:spPr>
+        <p:txBody>
+          <a:bodyPr vert="horz" lIns="91440" tIns="45720" rIns="91440" bIns="45720" rtlCol="0"/>
+          <a:lstStyle>
+            <a:lvl1pPr algn="r">
+              <a:defRPr sz="1200"/>
+            </a:lvl1pPr>
+          </a:lstStyle>
+          <a:p>
+            <a:fld id="{8C65E151-9CEB-CB40-A092-9E1DFF7319D6}" type="datetimeFigureOut">
+              <a:rPr lang="en-US" smtClean="0"/>
+              <a:t>12/30/14</a:t>
+            </a:fld>
+            <a:endParaRPr lang="en-US"/>
+          </a:p>
+        </p:txBody>
+      </p:sp>
+      <p:sp>
+        <p:nvSpPr>
+          <p:cNvPr id="4" name="Slide Image Placeholder 3"/>
+          <p:cNvSpPr>
+            <a:spLocks noGrp="1" noRot="1" noChangeAspect="1"/>
+          </p:cNvSpPr>
+          <p:nvPr>
+            <p:ph type="sldImg" idx="2"/>
+          </p:nvPr>
+        </p:nvSpPr>
+        <p:spPr>
+          <a:xfrm>
+            <a:off x="1143000" y="685800"/>
+            <a:ext cx="4572000" cy="3429000"/>
+          </a:xfrm>
+          <a:prstGeom prst="rect">
+            <a:avLst/>
+          </a:prstGeom>
+          <a:noFill/>
+          <a:ln w="12700">
+            <a:solidFill>
+              <a:prstClr val="black"/>
+            </a:solidFill>
+          </a:ln>
+        </p:spPr>
+        <p:txBody>
+          <a:bodyPr vert="horz" lIns="91440" tIns="45720" rIns="91440" bIns="45720" rtlCol="0" anchor="ctr"/>
+          <a:lstStyle/>
+          <a:p>
+            <a:endParaRPr lang="en-US"/>
+          </a:p>
+        </p:txBody>
+      </p:sp>
+      <p:sp>
+        <p:nvSpPr>
+          <p:cNvPr id="5" name="Notes Placeholder 4"/>
+          <p:cNvSpPr>
+            <a:spLocks noGrp="1"/>
+          </p:cNvSpPr>
+          <p:nvPr>
+            <p:ph type="body" sz="quarter" idx="3"/>
+          </p:nvPr>
+        </p:nvSpPr>
+        <p:spPr>
+          <a:xfrm>
+            <a:off x="685800" y="4343400"/>
+            <a:ext cx="5486400" cy="4114800"/>
+          </a:xfrm>
+          <a:prstGeom prst="rect">
+            <a:avLst/>
+          </a:prstGeom>
+        </p:spPr>
+        <p:txBody>
+          <a:bodyPr vert="horz" lIns="91440" tIns="45720" rIns="91440" bIns="45720" rtlCol="0"/>
+          <a:lstStyle/>
+          <a:p>
+            <a:pPr lvl="0"/>
+            <a:r>
+              <a:rPr lang="en-US" smtClean="0"/>
+              <a:t>Click to edit Master text styles</a:t>
+            </a:r>
+          </a:p>
+          <a:p>
+            <a:pPr lvl="1"/>
+            <a:r>
+              <a:rPr lang="en-US" smtClean="0"/>
+              <a:t>Second level</a:t>
+            </a:r>
+          </a:p>
+          <a:p>
+            <a:pPr lvl="2"/>
+            <a:r>
+              <a:rPr lang="en-US" smtClean="0"/>
+              <a:t>Third level</a:t>
+            </a:r>
+          </a:p>
+          <a:p>
+            <a:pPr lvl="3"/>
+            <a:r>
+              <a:rPr lang="en-US" smtClean="0"/>
+              <a:t>Fourth level</a:t>
+            </a:r>
+          </a:p>
+          <a:p>
+            <a:pPr lvl="4"/>
+            <a:r>
+              <a:rPr lang="en-US" smtClean="0"/>
+              <a:t>Fifth level</a:t>
+            </a:r>
+            <a:endParaRPr lang="en-US"/>
+          </a:p>
+        </p:txBody>
+      </p:sp>
+      <p:sp>
+        <p:nvSpPr>
+          <p:cNvPr id="6" name="Footer Placeholder 5"/>
+          <p:cNvSpPr>
+            <a:spLocks noGrp="1"/>
+          </p:cNvSpPr>
+          <p:nvPr>
+            <p:ph type="ftr" sz="quarter" idx="4"/>
+          </p:nvPr>
+        </p:nvSpPr>
+        <p:spPr>
+          <a:xfrm>
+            <a:off x="0" y="8685213"/>
+            <a:ext cx="2971800" cy="457200"/>
+          </a:xfrm>
+          <a:prstGeom prst="rect">
+            <a:avLst/>
+          </a:prstGeom>
+        </p:spPr>
+        <p:txBody>
+          <a:bodyPr vert="horz" lIns="91440" tIns="45720" rIns="91440" bIns="45720" rtlCol="0" anchor="b"/>
+          <a:lstStyle>
+            <a:lvl1pPr algn="l">
+              <a:defRPr sz="1200"/>
+            </a:lvl1pPr>
+          </a:lstStyle>
+          <a:p>
+            <a:endParaRPr lang="en-US"/>
+          </a:p>
+        </p:txBody>
+      </p:sp>
+      <p:sp>
+        <p:nvSpPr>
+          <p:cNvPr id="7" name="Slide Number Placeholder 6"/>
+          <p:cNvSpPr>
+            <a:spLocks noGrp="1"/>
+          </p:cNvSpPr>
+          <p:nvPr>
+            <p:ph type="sldNum" sz="quarter" idx="5"/>
+          </p:nvPr>
+        </p:nvSpPr>
+        <p:spPr>
+          <a:xfrm>
+            <a:off x="3884613" y="8685213"/>
+            <a:ext cx="2971800" cy="457200"/>
+          </a:xfrm>
+          <a:prstGeom prst="rect">
+            <a:avLst/>
+          </a:prstGeom>
+        </p:spPr>
+        <p:txBody>
+          <a:bodyPr vert="horz" lIns="91440" tIns="45720" rIns="91440" bIns="45720" rtlCol="0" anchor="b"/>
+          <a:lstStyle>
+            <a:lvl1pPr algn="r">
+              <a:defRPr sz="1200"/>
+            </a:lvl1pPr>
+          </a:lstStyle>
+          <a:p>
+            <a:fld id="{0E827EFA-5465-8D44-95A2-57B374621445}" type="slidenum">
+              <a:rPr lang="en-US" smtClean="0"/>
+              <a:t>‹#›</a:t>
+            </a:fld>
+            <a:endParaRPr lang="en-US"/>
+          </a:p>
+        </p:txBody>
+      </p:sp>
+    </p:spTree>
+    <p:extLst>
+      <p:ext uri="{BB962C8B-B14F-4D97-AF65-F5344CB8AC3E}">
+        <p14:creationId xmlns:p14="http://schemas.microsoft.com/office/powerpoint/2010/main" val="2086313579"/>
+      </p:ext>
+    </p:extLst>
+  </p:cSld>
+  <p:clrMap bg1="lt1" tx1="dk1" bg2="lt2" tx2="dk2" accent1="accent1" accent2="accent2" accent3="accent3" accent4="accent4" accent5="accent5" accent6="accent6" hlink="hlink" folHlink="folHlink"/>
+  <p:notesStyle>
+    <a:lvl1pPr marL="0" algn="l" defTabSz="457200" rtl="0" eaLnBrk="1" latinLnBrk="0" hangingPunct="1">
+      <a:defRPr sz="1200" kern="1200">
+        <a:solidFill>
+          <a:schemeClr val="tx1"/>
+        </a:solidFill>
+        <a:latin typeface="+mn-lt"/>
+        <a:ea typeface="+mn-ea"/>
+        <a:cs typeface="+mn-cs"/>
+      </a:defRPr>
+    </a:lvl1pPr>
+    <a:lvl2pPr marL="457200" algn="l" defTabSz="457200" rtl="0" eaLnBrk="1" latinLnBrk="0" hangingPunct="1">
+      <a:defRPr sz="1200" kern="1200">
+        <a:solidFill>
+          <a:schemeClr val="tx1"/>
+        </a:solidFill>
+        <a:latin typeface="+mn-lt"/>
+        <a:ea typeface="+mn-ea"/>
+        <a:cs typeface="+mn-cs"/>
+      </a:defRPr>
+    </a:lvl2pPr>
+    <a:lvl3pPr marL="914400" algn="l" defTabSz="457200" rtl="0" eaLnBrk="1" latinLnBrk="0" hangingPunct="1">
+      <a:defRPr sz="1200" kern="1200">
+        <a:solidFill>
+          <a:schemeClr val="tx1"/>
+        </a:solidFill>
+        <a:latin typeface="+mn-lt"/>
+        <a:ea typeface="+mn-ea"/>
+        <a:cs typeface="+mn-cs"/>
+      </a:defRPr>
+    </a:lvl3pPr>
+    <a:lvl4pPr marL="1371600" algn="l" defTabSz="457200" rtl="0" eaLnBrk="1" latinLnBrk="0" hangingPunct="1">
+      <a:defRPr sz="1200" kern="1200">
+        <a:solidFill>
+          <a:schemeClr val="tx1"/>
+        </a:solidFill>
+        <a:latin typeface="+mn-lt"/>
+        <a:ea typeface="+mn-ea"/>
+        <a:cs typeface="+mn-cs"/>
+      </a:defRPr>
+    </a:lvl4pPr>
+    <a:lvl5pPr marL="1828800" algn="l" defTabSz="457200" rtl="0" eaLnBrk="1" latinLnBrk="0" hangingPunct="1">
+      <a:defRPr sz="1200" kern="1200">
+        <a:solidFill>
+          <a:schemeClr val="tx1"/>
+        </a:solidFill>
+        <a:latin typeface="+mn-lt"/>
+        <a:ea typeface="+mn-ea"/>
+        <a:cs typeface="+mn-cs"/>
+      </a:defRPr>
+    </a:lvl5pPr>
+    <a:lvl6pPr marL="2286000" algn="l" defTabSz="457200" rtl="0" eaLnBrk="1" latinLnBrk="0" hangingPunct="1">
+      <a:defRPr sz="1200" kern="1200">
+        <a:solidFill>
+          <a:schemeClr val="tx1"/>
+        </a:solidFill>
+        <a:latin typeface="+mn-lt"/>
+        <a:ea typeface="+mn-ea"/>
+        <a:cs typeface="+mn-cs"/>
+      </a:defRPr>
+    </a:lvl6pPr>
+    <a:lvl7pPr marL="2743200" algn="l" defTabSz="457200" rtl="0" eaLnBrk="1" latinLnBrk="0" hangingPunct="1">
+      <a:defRPr sz="1200" kern="1200">
+        <a:solidFill>
+          <a:schemeClr val="tx1"/>
+        </a:solidFill>
+        <a:latin typeface="+mn-lt"/>
+        <a:ea typeface="+mn-ea"/>
+        <a:cs typeface="+mn-cs"/>
+      </a:defRPr>
+    </a:lvl7pPr>
+    <a:lvl8pPr marL="3200400" algn="l" defTabSz="457200" rtl="0" eaLnBrk="1" latinLnBrk="0" hangingPunct="1">
+      <a:defRPr sz="1200" kern="1200">
+        <a:solidFill>
+          <a:schemeClr val="tx1"/>
+        </a:solidFill>
+        <a:latin typeface="+mn-lt"/>
+        <a:ea typeface="+mn-ea"/>
+        <a:cs typeface="+mn-cs"/>
+      </a:defRPr>
+    </a:lvl8pPr>
+    <a:lvl9pPr marL="3657600" algn="l" defTabSz="457200" rtl="0" eaLnBrk="1" latinLnBrk="0" hangingPunct="1">
+      <a:defRPr sz="1200" kern="1200">
+        <a:solidFill>
+          <a:schemeClr val="tx1"/>
+        </a:solidFill>
+        <a:latin typeface="+mn-lt"/>
+        <a:ea typeface="+mn-ea"/>
+        <a:cs typeface="+mn-cs"/>
+      </a:defRPr>
+    </a:lvl9pPr>
+  </p:notesStyle>
+</p:notesMaster>
+</file>
+
+<file path=ppt/notesSlides/notesSlide1.xml><?xml version="1.0" encoding="utf-8"?>
+<p:notes xmlns:a="http://schemas.openxmlformats.org/drawingml/2006/main" xmlns:r="http://schemas.openxmlformats.org/officeDocument/2006/relationships" xmlns:p="http://schemas.openxmlformats.org/presentationml/2006/main">
+  <p:cSld>
+    <p:spTree>
+      <p:nvGrpSpPr>
+        <p:cNvPr id="1" name=""/>
+        <p:cNvGrpSpPr/>
+        <p:nvPr/>
+      </p:nvGrpSpPr>
+      <p:grpSpPr>
+        <a:xfrm>
+          <a:off x="0" y="0"/>
+          <a:ext cx="0" cy="0"/>
+          <a:chOff x="0" y="0"/>
+          <a:chExt cx="0" cy="0"/>
+        </a:xfrm>
+      </p:grpSpPr>
+      <p:sp>
+        <p:nvSpPr>
+          <p:cNvPr id="2" name="Slide Image Placeholder 1"/>
+          <p:cNvSpPr>
+            <a:spLocks noGrp="1" noRot="1" noChangeAspect="1"/>
+          </p:cNvSpPr>
+          <p:nvPr>
+            <p:ph type="sldImg"/>
+          </p:nvPr>
+        </p:nvSpPr>
+        <p:spPr/>
+      </p:sp>
+      <p:sp>
+        <p:nvSpPr>
+          <p:cNvPr id="3" name="Notes Placeholder 2"/>
+          <p:cNvSpPr>
+            <a:spLocks noGrp="1"/>
+          </p:cNvSpPr>
+          <p:nvPr>
+            <p:ph type="body" idx="1"/>
+          </p:nvPr>
+        </p:nvSpPr>
+        <p:spPr/>
+        <p:txBody>
+          <a:bodyPr/>
+          <a:lstStyle/>
+          <a:p>
+            <a:r>
+              <a:rPr lang="en-US" dirty="0" smtClean="0"/>
+              <a:t>Explain the purpose</a:t>
+            </a:r>
+            <a:r>
+              <a:rPr lang="en-US" baseline="0" dirty="0" smtClean="0"/>
+              <a:t> of the talk:</a:t>
+            </a:r>
+          </a:p>
+          <a:p>
+            <a:pPr marL="228600" indent="-228600">
+              <a:buAutoNum type="arabicParenR"/>
+            </a:pPr>
+            <a:r>
+              <a:rPr lang="en-US" baseline="0" dirty="0" smtClean="0"/>
+              <a:t>Glimpse of capabilities of Firebox V0</a:t>
+            </a:r>
+          </a:p>
+          <a:p>
+            <a:pPr marL="228600" indent="-228600">
+              <a:buAutoNum type="arabicParenR"/>
+            </a:pPr>
+            <a:r>
+              <a:rPr lang="en-US" baseline="0" dirty="0" smtClean="0"/>
+              <a:t>Set of interesting workloads we have been running and thinking about</a:t>
+            </a:r>
+          </a:p>
+          <a:p>
+            <a:pPr marL="228600" indent="-228600">
+              <a:buAutoNum type="arabicParenR"/>
+            </a:pPr>
+            <a:r>
+              <a:rPr lang="en-US" baseline="0" dirty="0" smtClean="0"/>
+              <a:t>Set of results/benchmarks of these workloads</a:t>
+            </a:r>
+            <a:endParaRPr lang="en-US" dirty="0"/>
+          </a:p>
+        </p:txBody>
+      </p:sp>
+      <p:sp>
+        <p:nvSpPr>
+          <p:cNvPr id="4" name="Slide Number Placeholder 3"/>
+          <p:cNvSpPr>
+            <a:spLocks noGrp="1"/>
+          </p:cNvSpPr>
+          <p:nvPr>
+            <p:ph type="sldNum" sz="quarter" idx="10"/>
+          </p:nvPr>
+        </p:nvSpPr>
+        <p:spPr/>
+        <p:txBody>
+          <a:bodyPr/>
+          <a:lstStyle/>
+          <a:p>
+            <a:fld id="{0E827EFA-5465-8D44-95A2-57B374621445}" type="slidenum">
+              <a:rPr lang="en-US" smtClean="0"/>
+              <a:t>2</a:t>
+            </a:fld>
+            <a:endParaRPr lang="en-US"/>
+          </a:p>
+        </p:txBody>
+      </p:sp>
+    </p:spTree>
+    <p:extLst>
+      <p:ext uri="{BB962C8B-B14F-4D97-AF65-F5344CB8AC3E}">
+        <p14:creationId xmlns:p14="http://schemas.microsoft.com/office/powerpoint/2010/main" val="718327898"/>
+      </p:ext>
+    </p:extLst>
+  </p:cSld>
+  <p:clrMapOvr>
+    <a:masterClrMapping/>
+  </p:clrMapOvr>
+</p:notes>
+</file>
+
+<file path=ppt/notesSlides/notesSlide2.xml><?xml version="1.0" encoding="utf-8"?>
+<p:notes xmlns:a="http://schemas.openxmlformats.org/drawingml/2006/main" xmlns:r="http://schemas.openxmlformats.org/officeDocument/2006/relationships" xmlns:p="http://schemas.openxmlformats.org/presentationml/2006/main">
+  <p:cSld>
+    <p:spTree>
+      <p:nvGrpSpPr>
+        <p:cNvPr id="1" name=""/>
+        <p:cNvGrpSpPr/>
+        <p:nvPr/>
+      </p:nvGrpSpPr>
+      <p:grpSpPr>
+        <a:xfrm>
+          <a:off x="0" y="0"/>
+          <a:ext cx="0" cy="0"/>
+          <a:chOff x="0" y="0"/>
+          <a:chExt cx="0" cy="0"/>
+        </a:xfrm>
+      </p:grpSpPr>
+      <p:sp>
+        <p:nvSpPr>
+          <p:cNvPr id="2" name="Slide Image Placeholder 1"/>
+          <p:cNvSpPr>
+            <a:spLocks noGrp="1" noRot="1" noChangeAspect="1"/>
+          </p:cNvSpPr>
+          <p:nvPr>
+            <p:ph type="sldImg"/>
+          </p:nvPr>
+        </p:nvSpPr>
+        <p:spPr/>
+      </p:sp>
+      <p:sp>
+        <p:nvSpPr>
+          <p:cNvPr id="3" name="Notes Placeholder 2"/>
+          <p:cNvSpPr>
+            <a:spLocks noGrp="1"/>
+          </p:cNvSpPr>
+          <p:nvPr>
+            <p:ph type="body" idx="1"/>
+          </p:nvPr>
+        </p:nvSpPr>
+        <p:spPr/>
+        <p:txBody>
+          <a:bodyPr/>
+          <a:lstStyle/>
+          <a:p>
+            <a:r>
+              <a:rPr lang="en-US" dirty="0" smtClean="0"/>
+              <a:t>Brief</a:t>
+            </a:r>
+            <a:r>
+              <a:rPr lang="en-US" baseline="0" dirty="0" smtClean="0"/>
+              <a:t> overview </a:t>
+            </a:r>
+            <a:r>
+              <a:rPr lang="en-US" baseline="0" smtClean="0"/>
+              <a:t>of Hardware / Software </a:t>
+            </a:r>
+            <a:r>
+              <a:rPr lang="en-US" baseline="0" dirty="0" smtClean="0"/>
+              <a:t>configuration of Firebox</a:t>
+            </a:r>
+            <a:endParaRPr lang="en-US" dirty="0" smtClean="0"/>
+          </a:p>
+        </p:txBody>
+      </p:sp>
+      <p:sp>
+        <p:nvSpPr>
+          <p:cNvPr id="4" name="Slide Number Placeholder 3"/>
+          <p:cNvSpPr>
+            <a:spLocks noGrp="1"/>
+          </p:cNvSpPr>
+          <p:nvPr>
+            <p:ph type="sldNum" sz="quarter" idx="10"/>
+          </p:nvPr>
+        </p:nvSpPr>
+        <p:spPr/>
+        <p:txBody>
+          <a:bodyPr/>
+          <a:lstStyle/>
+          <a:p>
+            <a:fld id="{0E827EFA-5465-8D44-95A2-57B374621445}" type="slidenum">
+              <a:rPr lang="en-US" smtClean="0"/>
+              <a:t>3</a:t>
+            </a:fld>
+            <a:endParaRPr lang="en-US"/>
+          </a:p>
+        </p:txBody>
+      </p:sp>
+    </p:spTree>
+    <p:extLst>
+      <p:ext uri="{BB962C8B-B14F-4D97-AF65-F5344CB8AC3E}">
+        <p14:creationId xmlns:p14="http://schemas.microsoft.com/office/powerpoint/2010/main" val="4179095948"/>
+      </p:ext>
+    </p:extLst>
+  </p:cSld>
+  <p:clrMapOvr>
+    <a:masterClrMapping/>
+  </p:clrMapOvr>
+</p:notes>
+</file>
+
 <file path=ppt/slideLayouts/slideLayout1.xml><?xml version="1.0" encoding="utf-8"?>
 <p:sldLayout xmlns:a="http://schemas.openxmlformats.org/drawingml/2006/main" xmlns:r="http://schemas.openxmlformats.org/officeDocument/2006/relationships" xmlns:p="http://schemas.openxmlformats.org/presentationml/2006/main" type="title" preserve="1">
   <p:cSld name="Title Slide">
@@ -290,7 +868,7 @@
           <a:p>
             <a:fld id="{C532CADC-E61B-5445-AB98-BD4DF8F28DCD}" type="datetimeFigureOut">
               <a:rPr lang="en-US" smtClean="0"/>
-              <a:t>12/17/14</a:t>
+              <a:t>12/28/14</a:t>
             </a:fld>
             <a:endParaRPr lang="en-US"/>
           </a:p>
@@ -460,7 +1038,7 @@
           <a:p>
             <a:fld id="{C532CADC-E61B-5445-AB98-BD4DF8F28DCD}" type="datetimeFigureOut">
               <a:rPr lang="en-US" smtClean="0"/>
-              <a:t>12/17/14</a:t>
+              <a:t>12/28/14</a:t>
             </a:fld>
             <a:endParaRPr lang="en-US"/>
           </a:p>
@@ -640,7 +1218,7 @@
           <a:p>
             <a:fld id="{C532CADC-E61B-5445-AB98-BD4DF8F28DCD}" type="datetimeFigureOut">
               <a:rPr lang="en-US" smtClean="0"/>
-              <a:t>12/17/14</a:t>
+              <a:t>12/28/14</a:t>
             </a:fld>
             <a:endParaRPr lang="en-US"/>
           </a:p>
@@ -810,7 +1388,7 @@
           <a:p>
             <a:fld id="{C532CADC-E61B-5445-AB98-BD4DF8F28DCD}" type="datetimeFigureOut">
               <a:rPr lang="en-US" smtClean="0"/>
-              <a:t>12/17/14</a:t>
+              <a:t>12/28/14</a:t>
             </a:fld>
             <a:endParaRPr lang="en-US"/>
           </a:p>
@@ -1056,7 +1634,7 @@
           <a:p>
             <a:fld id="{C532CADC-E61B-5445-AB98-BD4DF8F28DCD}" type="datetimeFigureOut">
               <a:rPr lang="en-US" smtClean="0"/>
-              <a:t>12/17/14</a:t>
+              <a:t>12/28/14</a:t>
             </a:fld>
             <a:endParaRPr lang="en-US"/>
           </a:p>
@@ -1344,7 +1922,7 @@
           <a:p>
             <a:fld id="{C532CADC-E61B-5445-AB98-BD4DF8F28DCD}" type="datetimeFigureOut">
               <a:rPr lang="en-US" smtClean="0"/>
-              <a:t>12/17/14</a:t>
+              <a:t>12/28/14</a:t>
             </a:fld>
             <a:endParaRPr lang="en-US"/>
           </a:p>
@@ -1766,7 +2344,7 @@
           <a:p>
             <a:fld id="{C532CADC-E61B-5445-AB98-BD4DF8F28DCD}" type="datetimeFigureOut">
               <a:rPr lang="en-US" smtClean="0"/>
-              <a:t>12/17/14</a:t>
+              <a:t>12/28/14</a:t>
             </a:fld>
             <a:endParaRPr lang="en-US"/>
           </a:p>
@@ -1884,7 +2462,7 @@
           <a:p>
             <a:fld id="{C532CADC-E61B-5445-AB98-BD4DF8F28DCD}" type="datetimeFigureOut">
               <a:rPr lang="en-US" smtClean="0"/>
-              <a:t>12/17/14</a:t>
+              <a:t>12/28/14</a:t>
             </a:fld>
             <a:endParaRPr lang="en-US"/>
           </a:p>
@@ -1979,7 +2557,7 @@
           <a:p>
             <a:fld id="{C532CADC-E61B-5445-AB98-BD4DF8F28DCD}" type="datetimeFigureOut">
               <a:rPr lang="en-US" smtClean="0"/>
-              <a:t>12/17/14</a:t>
+              <a:t>12/28/14</a:t>
             </a:fld>
             <a:endParaRPr lang="en-US"/>
           </a:p>
@@ -2256,7 +2834,7 @@
           <a:p>
             <a:fld id="{C532CADC-E61B-5445-AB98-BD4DF8F28DCD}" type="datetimeFigureOut">
               <a:rPr lang="en-US" smtClean="0"/>
-              <a:t>12/17/14</a:t>
+              <a:t>12/28/14</a:t>
             </a:fld>
             <a:endParaRPr lang="en-US"/>
           </a:p>
@@ -2509,7 +3087,7 @@
           <a:p>
             <a:fld id="{C532CADC-E61B-5445-AB98-BD4DF8F28DCD}" type="datetimeFigureOut">
               <a:rPr lang="en-US" smtClean="0"/>
-              <a:t>12/17/14</a:t>
+              <a:t>12/28/14</a:t>
             </a:fld>
             <a:endParaRPr lang="en-US"/>
           </a:p>
@@ -2722,7 +3300,7 @@
           <a:p>
             <a:fld id="{C532CADC-E61B-5445-AB98-BD4DF8F28DCD}" type="datetimeFigureOut">
               <a:rPr lang="en-US" smtClean="0"/>
-              <a:t>12/17/14</a:t>
+              <a:t>12/28/14</a:t>
             </a:fld>
             <a:endParaRPr lang="en-US"/>
           </a:p>
@@ -3105,6 +3683,617 @@
         </p:nvSpPr>
         <p:spPr>
           <a:xfrm>
+            <a:off x="2410160" y="2086427"/>
+            <a:ext cx="4585848" cy="1323439"/>
+          </a:xfrm>
+          <a:prstGeom prst="rect">
+            <a:avLst/>
+          </a:prstGeom>
+          <a:noFill/>
+        </p:spPr>
+        <p:txBody>
+          <a:bodyPr wrap="none" rtlCol="0">
+            <a:spAutoFit/>
+          </a:bodyPr>
+          <a:lstStyle/>
+          <a:p>
+            <a:pPr algn="ctr"/>
+            <a:r>
+              <a:rPr lang="en-US" sz="3000" b="1" dirty="0" smtClean="0"/>
+              <a:t>Firebox Workloads Analysis</a:t>
+            </a:r>
+          </a:p>
+          <a:p>
+            <a:pPr algn="ctr"/>
+            <a:endParaRPr lang="en-US" sz="2500" dirty="0" smtClean="0"/>
+          </a:p>
+          <a:p>
+            <a:pPr algn="ctr"/>
+            <a:r>
+              <a:rPr lang="en-US" sz="2500" dirty="0" smtClean="0"/>
+              <a:t>Joao Carreira</a:t>
+            </a:r>
+            <a:endParaRPr lang="en-US" sz="2500" dirty="0"/>
+          </a:p>
+        </p:txBody>
+      </p:sp>
+      <p:pic>
+        <p:nvPicPr>
+          <p:cNvPr id="5" name="Picture 2" descr="http://www.eecs.berkeley.edu/Research/Projects/Images/107112-1.gif"/>
+          <p:cNvPicPr>
+            <a:picLocks noChangeAspect="1" noChangeArrowheads="1"/>
+          </p:cNvPicPr>
+          <p:nvPr/>
+        </p:nvPicPr>
+        <p:blipFill>
+          <a:blip r:embed="rId2" cstate="print">
+            <a:extLst>
+              <a:ext uri="{28A0092B-C50C-407E-A947-70E740481C1C}">
+                <a14:useLocalDpi xmlns:a14="http://schemas.microsoft.com/office/drawing/2010/main" val="0"/>
+              </a:ext>
+            </a:extLst>
+          </a:blip>
+          <a:srcRect/>
+          <a:stretch>
+            <a:fillRect/>
+          </a:stretch>
+        </p:blipFill>
+        <p:spPr bwMode="auto">
+          <a:xfrm>
+            <a:off x="4412126" y="4559584"/>
+            <a:ext cx="2911541" cy="1106954"/>
+          </a:xfrm>
+          <a:prstGeom prst="rect">
+            <a:avLst/>
+          </a:prstGeom>
+          <a:noFill/>
+          <a:extLst>
+            <a:ext uri="{909E8E84-426E-40dd-AFC4-6F175D3DCCD1}">
+              <a14:hiddenFill xmlns:a14="http://schemas.microsoft.com/office/drawing/2010/main">
+                <a:solidFill>
+                  <a:srgbClr val="FFFFFF"/>
+                </a:solidFill>
+              </a14:hiddenFill>
+            </a:ext>
+          </a:extLst>
+        </p:spPr>
+      </p:pic>
+      <p:pic>
+        <p:nvPicPr>
+          <p:cNvPr id="6" name="Picture 556" descr="C:\Users\bjoern\Documents\My Dropbox\berkeley\cs160\final-presentations\ucseal_540_139.png"/>
+          <p:cNvPicPr>
+            <a:picLocks noChangeAspect="1" noChangeArrowheads="1"/>
+          </p:cNvPicPr>
+          <p:nvPr/>
+        </p:nvPicPr>
+        <p:blipFill>
+          <a:blip r:embed="rId3" cstate="print"/>
+          <a:stretch>
+            <a:fillRect/>
+          </a:stretch>
+        </p:blipFill>
+        <p:spPr bwMode="auto">
+          <a:xfrm>
+            <a:off x="2054959" y="4606005"/>
+            <a:ext cx="1049486" cy="1049486"/>
+          </a:xfrm>
+          <a:prstGeom prst="rect">
+            <a:avLst/>
+          </a:prstGeom>
+          <a:noFill/>
+        </p:spPr>
+      </p:pic>
+    </p:spTree>
+    <p:extLst>
+      <p:ext uri="{BB962C8B-B14F-4D97-AF65-F5344CB8AC3E}">
+        <p14:creationId xmlns:p14="http://schemas.microsoft.com/office/powerpoint/2010/main" val="1172503018"/>
+      </p:ext>
+    </p:extLst>
+  </p:cSld>
+  <p:clrMapOvr>
+    <a:masterClrMapping/>
+  </p:clrMapOvr>
+  <p:timing>
+    <p:tnLst>
+      <p:par>
+        <p:cTn xmlns:p14="http://schemas.microsoft.com/office/powerpoint/2010/main" id="1" dur="indefinite" restart="never" nodeType="tmRoot"/>
+      </p:par>
+    </p:tnLst>
+  </p:timing>
+</p:sld>
+</file>
+
+<file path=ppt/slides/slide2.xml><?xml version="1.0" encoding="utf-8"?>
+<p:sld xmlns:a="http://schemas.openxmlformats.org/drawingml/2006/main" xmlns:r="http://schemas.openxmlformats.org/officeDocument/2006/relationships" xmlns:p="http://schemas.openxmlformats.org/presentationml/2006/main">
+  <p:cSld>
+    <p:spTree>
+      <p:nvGrpSpPr>
+        <p:cNvPr id="1" name=""/>
+        <p:cNvGrpSpPr/>
+        <p:nvPr/>
+      </p:nvGrpSpPr>
+      <p:grpSpPr>
+        <a:xfrm>
+          <a:off x="0" y="0"/>
+          <a:ext cx="0" cy="0"/>
+          <a:chOff x="0" y="0"/>
+          <a:chExt cx="0" cy="0"/>
+        </a:xfrm>
+      </p:grpSpPr>
+      <p:sp>
+        <p:nvSpPr>
+          <p:cNvPr id="7" name="TextBox 6"/>
+          <p:cNvSpPr txBox="1"/>
+          <p:nvPr/>
+        </p:nvSpPr>
+        <p:spPr>
+          <a:xfrm>
+            <a:off x="619688" y="600062"/>
+            <a:ext cx="1373768" cy="553998"/>
+          </a:xfrm>
+          <a:prstGeom prst="rect">
+            <a:avLst/>
+          </a:prstGeom>
+          <a:noFill/>
+        </p:spPr>
+        <p:txBody>
+          <a:bodyPr wrap="none" rtlCol="0">
+            <a:spAutoFit/>
+          </a:bodyPr>
+          <a:lstStyle/>
+          <a:p>
+            <a:pPr algn="ctr"/>
+            <a:r>
+              <a:rPr lang="en-US" sz="3000" b="1" dirty="0" smtClean="0"/>
+              <a:t>Outline</a:t>
+            </a:r>
+            <a:endParaRPr lang="en-US" sz="3000" b="1" dirty="0" smtClean="0"/>
+          </a:p>
+        </p:txBody>
+      </p:sp>
+      <p:sp>
+        <p:nvSpPr>
+          <p:cNvPr id="2" name="TextBox 1"/>
+          <p:cNvSpPr txBox="1"/>
+          <p:nvPr/>
+        </p:nvSpPr>
+        <p:spPr>
+          <a:xfrm>
+            <a:off x="619688" y="1918821"/>
+            <a:ext cx="5031922" cy="2308324"/>
+          </a:xfrm>
+          <a:prstGeom prst="rect">
+            <a:avLst/>
+          </a:prstGeom>
+          <a:noFill/>
+        </p:spPr>
+        <p:txBody>
+          <a:bodyPr wrap="none" rtlCol="0">
+            <a:spAutoFit/>
+          </a:bodyPr>
+          <a:lstStyle/>
+          <a:p>
+            <a:r>
+              <a:rPr lang="en-US" dirty="0" smtClean="0"/>
+              <a:t>Workloads</a:t>
+            </a:r>
+          </a:p>
+          <a:p>
+            <a:endParaRPr lang="en-US" dirty="0"/>
+          </a:p>
+          <a:p>
+            <a:r>
+              <a:rPr lang="en-US" dirty="0" smtClean="0"/>
+              <a:t>Set of benchmarks / workloads running in Firebox-0</a:t>
+            </a:r>
+            <a:endParaRPr lang="en-US" dirty="0"/>
+          </a:p>
+          <a:p>
+            <a:pPr marL="285750" indent="-285750">
+              <a:buFontTx/>
+              <a:buChar char="-"/>
+            </a:pPr>
+            <a:r>
+              <a:rPr lang="en-US" dirty="0" err="1" smtClean="0"/>
+              <a:t>Aerospike</a:t>
+            </a:r>
+            <a:r>
+              <a:rPr lang="en-US" dirty="0" smtClean="0"/>
+              <a:t> </a:t>
+            </a:r>
+            <a:r>
+              <a:rPr lang="en-US" dirty="0" smtClean="0"/>
+              <a:t>(YCSB)</a:t>
+            </a:r>
+          </a:p>
+          <a:p>
+            <a:pPr marL="285750" indent="-285750">
+              <a:buFontTx/>
+              <a:buChar char="-"/>
+            </a:pPr>
+            <a:r>
+              <a:rPr lang="en-US" dirty="0" err="1" smtClean="0"/>
+              <a:t>Ramcloud</a:t>
+            </a:r>
+            <a:r>
+              <a:rPr lang="en-US" dirty="0" smtClean="0"/>
+              <a:t> </a:t>
+            </a:r>
+            <a:r>
+              <a:rPr lang="en-US" dirty="0" smtClean="0"/>
+              <a:t>(YCSB, </a:t>
+            </a:r>
+            <a:r>
+              <a:rPr lang="en-US" dirty="0" err="1" smtClean="0"/>
+              <a:t>Clusterperf</a:t>
+            </a:r>
+            <a:r>
+              <a:rPr lang="en-US" dirty="0" smtClean="0"/>
+              <a:t>)</a:t>
+            </a:r>
+          </a:p>
+          <a:p>
+            <a:pPr marL="285750" indent="-285750">
+              <a:buFontTx/>
+              <a:buChar char="-"/>
+            </a:pPr>
+            <a:r>
+              <a:rPr lang="en-US" dirty="0" smtClean="0"/>
+              <a:t>Network </a:t>
+            </a:r>
+            <a:r>
+              <a:rPr lang="en-US" dirty="0" smtClean="0"/>
+              <a:t>(latencies, bandwidths)</a:t>
+            </a:r>
+          </a:p>
+          <a:p>
+            <a:r>
+              <a:rPr lang="en-US" dirty="0" smtClean="0"/>
+              <a:t>Spark, Cassandra (YCSB, </a:t>
+            </a:r>
+            <a:r>
+              <a:rPr lang="en-US" dirty="0" err="1" smtClean="0"/>
+              <a:t>Terasort</a:t>
+            </a:r>
+            <a:r>
+              <a:rPr lang="en-US" dirty="0" smtClean="0"/>
+              <a:t>)</a:t>
+            </a:r>
+          </a:p>
+          <a:p>
+            <a:r>
+              <a:rPr lang="en-US" dirty="0" err="1" smtClean="0"/>
+              <a:t>BigDataBenchmark</a:t>
+            </a:r>
+            <a:r>
+              <a:rPr lang="en-US" dirty="0" smtClean="0"/>
+              <a:t> Impala, Hive, </a:t>
+            </a:r>
+            <a:r>
+              <a:rPr lang="en-US" dirty="0" err="1" smtClean="0"/>
+              <a:t>Tez</a:t>
+            </a:r>
+            <a:r>
+              <a:rPr lang="en-US" dirty="0" smtClean="0"/>
+              <a:t>, Redshift</a:t>
+            </a:r>
+            <a:endParaRPr lang="en-US" dirty="0"/>
+          </a:p>
+        </p:txBody>
+      </p:sp>
+    </p:spTree>
+    <p:extLst>
+      <p:ext uri="{BB962C8B-B14F-4D97-AF65-F5344CB8AC3E}">
+        <p14:creationId xmlns:p14="http://schemas.microsoft.com/office/powerpoint/2010/main" val="3321272537"/>
+      </p:ext>
+    </p:extLst>
+  </p:cSld>
+  <p:clrMapOvr>
+    <a:masterClrMapping/>
+  </p:clrMapOvr>
+  <p:timing>
+    <p:tnLst>
+      <p:par>
+        <p:cTn xmlns:p14="http://schemas.microsoft.com/office/powerpoint/2010/main" id="1" dur="indefinite" restart="never" nodeType="tmRoot"/>
+      </p:par>
+    </p:tnLst>
+  </p:timing>
+</p:sld>
+</file>
+
+<file path=ppt/slides/slide3.xml><?xml version="1.0" encoding="utf-8"?>
+<p:sld xmlns:a="http://schemas.openxmlformats.org/drawingml/2006/main" xmlns:r="http://schemas.openxmlformats.org/officeDocument/2006/relationships" xmlns:p="http://schemas.openxmlformats.org/presentationml/2006/main">
+  <p:cSld>
+    <p:spTree>
+      <p:nvGrpSpPr>
+        <p:cNvPr id="1" name=""/>
+        <p:cNvGrpSpPr/>
+        <p:nvPr/>
+      </p:nvGrpSpPr>
+      <p:grpSpPr>
+        <a:xfrm>
+          <a:off x="0" y="0"/>
+          <a:ext cx="0" cy="0"/>
+          <a:chOff x="0" y="0"/>
+          <a:chExt cx="0" cy="0"/>
+        </a:xfrm>
+      </p:grpSpPr>
+      <p:sp>
+        <p:nvSpPr>
+          <p:cNvPr id="7" name="TextBox 6"/>
+          <p:cNvSpPr txBox="1"/>
+          <p:nvPr/>
+        </p:nvSpPr>
+        <p:spPr>
+          <a:xfrm>
+            <a:off x="505708" y="600062"/>
+            <a:ext cx="3415343" cy="553998"/>
+          </a:xfrm>
+          <a:prstGeom prst="rect">
+            <a:avLst/>
+          </a:prstGeom>
+          <a:noFill/>
+        </p:spPr>
+        <p:txBody>
+          <a:bodyPr wrap="none" rtlCol="0">
+            <a:spAutoFit/>
+          </a:bodyPr>
+          <a:lstStyle/>
+          <a:p>
+            <a:pPr algn="ctr"/>
+            <a:r>
+              <a:rPr lang="en-US" sz="3000" b="1" dirty="0" smtClean="0"/>
+              <a:t>What is Firebox – 0?</a:t>
+            </a:r>
+            <a:endParaRPr lang="en-US" sz="3000" b="1" dirty="0" smtClean="0"/>
+          </a:p>
+        </p:txBody>
+      </p:sp>
+      <p:sp>
+        <p:nvSpPr>
+          <p:cNvPr id="3" name="TextBox 2"/>
+          <p:cNvSpPr txBox="1"/>
+          <p:nvPr/>
+        </p:nvSpPr>
+        <p:spPr>
+          <a:xfrm>
+            <a:off x="619688" y="1707156"/>
+            <a:ext cx="8036740" cy="3693319"/>
+          </a:xfrm>
+          <a:prstGeom prst="rect">
+            <a:avLst/>
+          </a:prstGeom>
+          <a:noFill/>
+        </p:spPr>
+        <p:txBody>
+          <a:bodyPr wrap="square" rtlCol="0">
+            <a:spAutoFit/>
+          </a:bodyPr>
+          <a:lstStyle/>
+          <a:p>
+            <a:r>
+              <a:rPr lang="en-US" dirty="0" smtClean="0"/>
+              <a:t>- Firebox – 0:</a:t>
+            </a:r>
+          </a:p>
+          <a:p>
+            <a:pPr marL="450850" indent="-280988">
+              <a:buFont typeface="Arial"/>
+              <a:buChar char="•"/>
+            </a:pPr>
+            <a:r>
+              <a:rPr lang="en-US" dirty="0" smtClean="0"/>
+              <a:t>16-node cluster</a:t>
+            </a:r>
+          </a:p>
+          <a:p>
+            <a:pPr marL="450850" indent="-280988">
+              <a:buFont typeface="Arial"/>
+              <a:buChar char="•"/>
+            </a:pPr>
+            <a:r>
+              <a:rPr lang="en-US" dirty="0" err="1" smtClean="0"/>
+              <a:t>Infiniband</a:t>
+            </a:r>
+            <a:r>
+              <a:rPr lang="en-US" dirty="0" smtClean="0"/>
+              <a:t> interconnect</a:t>
+            </a:r>
+          </a:p>
+          <a:p>
+            <a:pPr marL="285750" indent="-285750">
+              <a:buFont typeface="Arial"/>
+              <a:buChar char="•"/>
+            </a:pPr>
+            <a:endParaRPr lang="en-US" dirty="0"/>
+          </a:p>
+          <a:p>
+            <a:r>
+              <a:rPr lang="en-US" dirty="0" smtClean="0"/>
+              <a:t>- Node configuration:</a:t>
+            </a:r>
+            <a:endParaRPr lang="en-US" dirty="0"/>
+          </a:p>
+          <a:p>
+            <a:pPr marL="169863" indent="280988">
+              <a:buFont typeface="Arial"/>
+              <a:buChar char="•"/>
+              <a:tabLst>
+                <a:tab pos="169863" algn="l"/>
+              </a:tabLst>
+            </a:pPr>
+            <a:r>
+              <a:rPr lang="en-US" dirty="0" smtClean="0"/>
+              <a:t>Inte</a:t>
+            </a:r>
+            <a:r>
+              <a:rPr lang="en-US" dirty="0" smtClean="0"/>
+              <a:t>l Ivy Bridge 8Cores/16Threads 3.0GHz 25MB</a:t>
+            </a:r>
+          </a:p>
+          <a:p>
+            <a:pPr marL="169863" indent="280988">
+              <a:buFont typeface="Arial"/>
+              <a:buChar char="•"/>
+              <a:tabLst>
+                <a:tab pos="169863" algn="l"/>
+              </a:tabLst>
+            </a:pPr>
+            <a:r>
+              <a:rPr lang="en-US" dirty="0" smtClean="0"/>
+              <a:t>64GB RAM</a:t>
+            </a:r>
+          </a:p>
+          <a:p>
+            <a:pPr marL="169863" indent="280988">
+              <a:buFont typeface="Arial"/>
+              <a:buChar char="•"/>
+              <a:tabLst>
+                <a:tab pos="169863" algn="l"/>
+              </a:tabLst>
+            </a:pPr>
+            <a:r>
+              <a:rPr lang="en-US" dirty="0" smtClean="0"/>
+              <a:t>2 SSDs (120GB + 480GB)</a:t>
+            </a:r>
+          </a:p>
+          <a:p>
+            <a:pPr marL="169863" indent="280988">
+              <a:buFont typeface="Arial"/>
+              <a:buChar char="•"/>
+              <a:tabLst>
+                <a:tab pos="169863" algn="l"/>
+              </a:tabLst>
+            </a:pPr>
+            <a:r>
+              <a:rPr lang="en-US" dirty="0" err="1" smtClean="0"/>
+              <a:t>Infiniband</a:t>
+            </a:r>
+            <a:r>
+              <a:rPr lang="en-US" dirty="0" smtClean="0"/>
+              <a:t>: </a:t>
+            </a:r>
+            <a:r>
+              <a:rPr lang="en-US" dirty="0" err="1" smtClean="0"/>
+              <a:t>Mellanox</a:t>
+            </a:r>
+            <a:r>
+              <a:rPr lang="en-US" dirty="0" smtClean="0"/>
+              <a:t> ConnectX-3 VPI MCX354A-FCBT FDR QSFP 56Gbps</a:t>
+            </a:r>
+          </a:p>
+          <a:p>
+            <a:pPr marL="169863" indent="280988">
+              <a:buFont typeface="Arial"/>
+              <a:buChar char="•"/>
+              <a:tabLst>
+                <a:tab pos="169863" algn="l"/>
+              </a:tabLst>
+            </a:pPr>
+            <a:r>
+              <a:rPr lang="en-US" dirty="0" smtClean="0"/>
+              <a:t>Ethernet: </a:t>
+            </a:r>
+            <a:r>
+              <a:rPr lang="en-US" dirty="0" err="1" smtClean="0"/>
+              <a:t>Mellanox</a:t>
+            </a:r>
+            <a:r>
+              <a:rPr lang="en-US" dirty="0" smtClean="0"/>
+              <a:t> ConnextX-3 EN MCX314A-BCBT QSFP 40Gb</a:t>
+            </a:r>
+          </a:p>
+          <a:p>
+            <a:pPr marL="169863" indent="280988">
+              <a:buFont typeface="Arial"/>
+              <a:buChar char="•"/>
+              <a:tabLst>
+                <a:tab pos="169863" algn="l"/>
+              </a:tabLst>
+            </a:pPr>
+            <a:r>
+              <a:rPr lang="en-US" dirty="0" smtClean="0"/>
+              <a:t>Running Ubuntu 14.04 (Linux </a:t>
+            </a:r>
+            <a:r>
+              <a:rPr lang="en-US" dirty="0" smtClean="0"/>
+              <a:t>3.13.0)</a:t>
+            </a:r>
+            <a:endParaRPr lang="en-US" dirty="0" smtClean="0"/>
+          </a:p>
+          <a:p>
+            <a:pPr marL="169863" indent="280988">
+              <a:tabLst>
+                <a:tab pos="169863" algn="l"/>
+              </a:tabLst>
+            </a:pPr>
+            <a:endParaRPr lang="en-US" dirty="0" smtClean="0"/>
+          </a:p>
+          <a:p>
+            <a:pPr marL="285750" indent="-285750">
+              <a:buFontTx/>
+              <a:buChar char="-"/>
+            </a:pPr>
+            <a:r>
+              <a:rPr lang="en-US" dirty="0" smtClean="0"/>
+              <a:t>Each node is connected to 1 </a:t>
+            </a:r>
+            <a:r>
+              <a:rPr lang="en-US" dirty="0" err="1" smtClean="0"/>
+              <a:t>Infiniband</a:t>
+            </a:r>
+            <a:r>
+              <a:rPr lang="en-US" dirty="0" smtClean="0"/>
+              <a:t> and 1 Ethernet switch</a:t>
+            </a:r>
+          </a:p>
+        </p:txBody>
+      </p:sp>
+    </p:spTree>
+    <p:extLst>
+      <p:ext uri="{BB962C8B-B14F-4D97-AF65-F5344CB8AC3E}">
+        <p14:creationId xmlns:p14="http://schemas.microsoft.com/office/powerpoint/2010/main" val="2389898637"/>
+      </p:ext>
+    </p:extLst>
+  </p:cSld>
+  <p:clrMapOvr>
+    <a:masterClrMapping/>
+  </p:clrMapOvr>
+  <p:timing>
+    <p:tnLst>
+      <p:par>
+        <p:cTn xmlns:p14="http://schemas.microsoft.com/office/powerpoint/2010/main" id="1" dur="indefinite" restart="never" nodeType="tmRoot"/>
+      </p:par>
+    </p:tnLst>
+  </p:timing>
+</p:sld>
+</file>
+
+<file path=ppt/slides/slide4.xml><?xml version="1.0" encoding="utf-8"?>
+<p:sld xmlns:a="http://schemas.openxmlformats.org/drawingml/2006/main" xmlns:r="http://schemas.openxmlformats.org/officeDocument/2006/relationships" xmlns:p="http://schemas.openxmlformats.org/presentationml/2006/main">
+  <p:cSld>
+    <p:spTree>
+      <p:nvGrpSpPr>
+        <p:cNvPr id="1" name=""/>
+        <p:cNvGrpSpPr/>
+        <p:nvPr/>
+      </p:nvGrpSpPr>
+      <p:grpSpPr>
+        <a:xfrm>
+          <a:off x="0" y="0"/>
+          <a:ext cx="0" cy="0"/>
+          <a:chOff x="0" y="0"/>
+          <a:chExt cx="0" cy="0"/>
+        </a:xfrm>
+      </p:grpSpPr>
+      <p:sp>
+        <p:nvSpPr>
+          <p:cNvPr id="7" name="TextBox 6"/>
+          <p:cNvSpPr txBox="1"/>
+          <p:nvPr/>
+        </p:nvSpPr>
+        <p:spPr>
+          <a:xfrm>
             <a:off x="322431" y="302842"/>
             <a:ext cx="4753036" cy="553998"/>
           </a:xfrm>
@@ -3136,7 +4325,7 @@
           <p:nvPr>
             <p:extLst>
               <p:ext uri="{D42A27DB-BD31-4B8C-83A1-F6EECF244321}">
-                <p14:modId xmlns:p14="http://schemas.microsoft.com/office/powerpoint/2010/main" val="1267255002"/>
+                <p14:modId xmlns:p14="http://schemas.microsoft.com/office/powerpoint/2010/main" val="3973256469"/>
               </p:ext>
             </p:extLst>
           </p:nvPr>
@@ -3270,7 +4459,7 @@
           <p:nvPr>
             <p:extLst>
               <p:ext uri="{D42A27DB-BD31-4B8C-83A1-F6EECF244321}">
-                <p14:modId xmlns:p14="http://schemas.microsoft.com/office/powerpoint/2010/main" val="2459835310"/>
+                <p14:modId xmlns:p14="http://schemas.microsoft.com/office/powerpoint/2010/main" val="1781179005"/>
               </p:ext>
             </p:extLst>
           </p:nvPr>
@@ -3453,7 +4642,15 @@
             </a:r>
             <a:r>
               <a:rPr lang="en-US" b="1" dirty="0" smtClean="0"/>
-              <a:t> socket library with kernel bypass</a:t>
+              <a:t> </a:t>
+            </a:r>
+            <a:r>
+              <a:rPr lang="en-US" b="1" dirty="0" smtClean="0"/>
+              <a:t>socket </a:t>
+            </a:r>
+            <a:r>
+              <a:rPr lang="en-US" b="1" dirty="0" smtClean="0"/>
+              <a:t>library with kernel bypass</a:t>
             </a:r>
             <a:endParaRPr lang="en-US" b="1" dirty="0"/>
           </a:p>
@@ -3462,7 +4659,7 @@
     </p:spTree>
     <p:extLst>
       <p:ext uri="{BB962C8B-B14F-4D97-AF65-F5344CB8AC3E}">
-        <p14:creationId xmlns:p14="http://schemas.microsoft.com/office/powerpoint/2010/main" val="1172503018"/>
+        <p14:creationId xmlns:p14="http://schemas.microsoft.com/office/powerpoint/2010/main" val="1155595116"/>
       </p:ext>
     </p:extLst>
   </p:cSld>
@@ -3479,7 +4676,7 @@
 </p:sld>
 </file>
 
-<file path=ppt/slides/slide2.xml><?xml version="1.0" encoding="utf-8"?>
+<file path=ppt/slides/slide5.xml><?xml version="1.0" encoding="utf-8"?>
 <p:sld xmlns:a="http://schemas.openxmlformats.org/drawingml/2006/main" xmlns:r="http://schemas.openxmlformats.org/officeDocument/2006/relationships" xmlns:p="http://schemas.openxmlformats.org/presentationml/2006/main">
   <p:cSld>
     <p:spTree>
@@ -3505,7 +4702,7 @@
         <p:spPr>
           <a:xfrm>
             <a:off x="128046" y="302842"/>
-            <a:ext cx="9029485" cy="553998"/>
+            <a:ext cx="9206817" cy="553998"/>
           </a:xfrm>
           <a:prstGeom prst="rect">
             <a:avLst/>
@@ -3520,76 +4717,88 @@
           <a:p>
             <a:r>
               <a:rPr lang="en-US" sz="3000" b="1" dirty="0" err="1" smtClean="0"/>
-              <a:t>Ramcloud</a:t>
+              <a:t>RAMCloud</a:t>
             </a:r>
             <a:r>
               <a:rPr lang="en-US" sz="3000" b="1" dirty="0" smtClean="0"/>
-              <a:t> Read/Write benchmark (Bandwidth/latency)</a:t>
+              <a:t> </a:t>
+            </a:r>
+            <a:r>
+              <a:rPr lang="en-US" sz="3000" b="1" dirty="0" smtClean="0"/>
+              <a:t>Read/Write benchmark (Bandwidth/Latency)</a:t>
             </a:r>
             <a:endParaRPr lang="en-US" sz="3000" b="1" dirty="0"/>
           </a:p>
         </p:txBody>
       </p:sp>
-      <p:pic>
-        <p:nvPicPr>
-          <p:cNvPr id="12" name="Picture 11" descr="ramcloud_benchmark_bw_illust.pdf"/>
-          <p:cNvPicPr>
-            <a:picLocks noChangeAspect="1"/>
-          </p:cNvPicPr>
+      <p:sp>
+        <p:nvSpPr>
+          <p:cNvPr id="2" name="TextBox 1"/>
+          <p:cNvSpPr txBox="1"/>
           <p:nvPr/>
-        </p:nvPicPr>
-        <p:blipFill>
-          <a:blip r:embed="rId2">
-            <a:extLst>
-              <a:ext uri="{28A0092B-C50C-407E-A947-70E740481C1C}">
-                <a14:useLocalDpi xmlns:a14="http://schemas.microsoft.com/office/drawing/2010/main" val="0"/>
-              </a:ext>
-            </a:extLst>
-          </a:blip>
-          <a:stretch>
-            <a:fillRect/>
-          </a:stretch>
-        </p:blipFill>
+        </p:nvSpPr>
         <p:spPr>
           <a:xfrm>
-            <a:off x="115356" y="1410627"/>
-            <a:ext cx="4481663" cy="4114314"/>
+            <a:off x="552195" y="5857055"/>
+            <a:ext cx="3694942" cy="369332"/>
           </a:xfrm>
           <a:prstGeom prst="rect">
             <a:avLst/>
           </a:prstGeom>
+          <a:noFill/>
         </p:spPr>
-      </p:pic>
-      <p:pic>
-        <p:nvPicPr>
-          <p:cNvPr id="13" name="Picture 12" descr="ramcloud_benchmark_lat_illus.pdf"/>
-          <p:cNvPicPr>
-            <a:picLocks noChangeAspect="1"/>
-          </p:cNvPicPr>
+        <p:txBody>
+          <a:bodyPr wrap="none" rtlCol="0">
+            <a:spAutoFit/>
+          </a:bodyPr>
+          <a:lstStyle/>
+          <a:p>
+            <a:r>
+              <a:rPr lang="en-US" dirty="0" err="1" smtClean="0"/>
+              <a:t>PCIe</a:t>
+            </a:r>
+            <a:r>
+              <a:rPr lang="en-US" dirty="0" smtClean="0"/>
+              <a:t> card is bottleneck for bandwidth</a:t>
+            </a:r>
+            <a:endParaRPr lang="en-US" dirty="0"/>
+          </a:p>
+        </p:txBody>
+      </p:sp>
+      <p:sp>
+        <p:nvSpPr>
+          <p:cNvPr id="4" name="TextBox 3"/>
+          <p:cNvSpPr txBox="1"/>
           <p:nvPr/>
-        </p:nvPicPr>
-        <p:blipFill>
-          <a:blip r:embed="rId3">
-            <a:extLst>
-              <a:ext uri="{28A0092B-C50C-407E-A947-70E740481C1C}">
-                <a14:useLocalDpi xmlns:a14="http://schemas.microsoft.com/office/drawing/2010/main" val="0"/>
-              </a:ext>
-            </a:extLst>
-          </a:blip>
-          <a:stretch>
-            <a:fillRect/>
-          </a:stretch>
-        </p:blipFill>
+        </p:nvSpPr>
         <p:spPr>
           <a:xfrm>
-            <a:off x="4721088" y="1410627"/>
-            <a:ext cx="4326561" cy="4114314"/>
+            <a:off x="619688" y="1918821"/>
+            <a:ext cx="4874013" cy="369332"/>
           </a:xfrm>
           <a:prstGeom prst="rect">
             <a:avLst/>
           </a:prstGeom>
+          <a:noFill/>
         </p:spPr>
-      </p:pic>
+        <p:txBody>
+          <a:bodyPr wrap="none" rtlCol="0">
+            <a:spAutoFit/>
+          </a:bodyPr>
+          <a:lstStyle/>
+          <a:p>
+            <a:r>
+              <a:rPr lang="en-US" dirty="0" err="1" smtClean="0"/>
+              <a:t>ClusterPerf</a:t>
+            </a:r>
+            <a:r>
+              <a:rPr lang="en-US" dirty="0" smtClean="0"/>
+              <a:t> (read/write latencies and bandwidths)</a:t>
+            </a:r>
+            <a:endParaRPr lang="en-US" dirty="0"/>
+          </a:p>
+        </p:txBody>
+      </p:sp>
     </p:spTree>
     <p:extLst>
       <p:ext uri="{BB962C8B-B14F-4D97-AF65-F5344CB8AC3E}">
@@ -3610,7 +4819,201 @@
 </p:sld>
 </file>
 
-<file path=ppt/slides/slide3.xml><?xml version="1.0" encoding="utf-8"?>
+<file path=ppt/slides/slide6.xml><?xml version="1.0" encoding="utf-8"?>
+<p:sld xmlns:a="http://schemas.openxmlformats.org/drawingml/2006/main" xmlns:r="http://schemas.openxmlformats.org/officeDocument/2006/relationships" xmlns:p="http://schemas.openxmlformats.org/presentationml/2006/main">
+  <p:cSld>
+    <p:spTree>
+      <p:nvGrpSpPr>
+        <p:cNvPr id="1" name=""/>
+        <p:cNvGrpSpPr/>
+        <p:nvPr/>
+      </p:nvGrpSpPr>
+      <p:grpSpPr>
+        <a:xfrm>
+          <a:off x="0" y="0"/>
+          <a:ext cx="0" cy="0"/>
+          <a:chOff x="0" y="0"/>
+          <a:chExt cx="0" cy="0"/>
+        </a:xfrm>
+      </p:grpSpPr>
+      <p:sp>
+        <p:nvSpPr>
+          <p:cNvPr id="7" name="TextBox 6"/>
+          <p:cNvSpPr txBox="1"/>
+          <p:nvPr/>
+        </p:nvSpPr>
+        <p:spPr>
+          <a:xfrm>
+            <a:off x="128046" y="302842"/>
+            <a:ext cx="1816160" cy="553998"/>
+          </a:xfrm>
+          <a:prstGeom prst="rect">
+            <a:avLst/>
+          </a:prstGeom>
+          <a:noFill/>
+        </p:spPr>
+        <p:txBody>
+          <a:bodyPr wrap="none" rtlCol="0">
+            <a:spAutoFit/>
+          </a:bodyPr>
+          <a:lstStyle/>
+          <a:p>
+            <a:r>
+              <a:rPr lang="en-US" sz="3000" b="1" dirty="0" err="1" smtClean="0"/>
+              <a:t>AeroSpike</a:t>
+            </a:r>
+            <a:endParaRPr lang="en-US" sz="3000" b="1" dirty="0"/>
+          </a:p>
+        </p:txBody>
+      </p:sp>
+      <p:sp>
+        <p:nvSpPr>
+          <p:cNvPr id="3" name="TextBox 2"/>
+          <p:cNvSpPr txBox="1"/>
+          <p:nvPr/>
+        </p:nvSpPr>
+        <p:spPr>
+          <a:xfrm>
+            <a:off x="619688" y="1918821"/>
+            <a:ext cx="5288627" cy="369332"/>
+          </a:xfrm>
+          <a:prstGeom prst="rect">
+            <a:avLst/>
+          </a:prstGeom>
+          <a:noFill/>
+        </p:spPr>
+        <p:txBody>
+          <a:bodyPr wrap="none" rtlCol="0">
+            <a:spAutoFit/>
+          </a:bodyPr>
+          <a:lstStyle/>
+          <a:p>
+            <a:r>
+              <a:rPr lang="en-US" dirty="0" smtClean="0"/>
+              <a:t>YSCB latencies and bandwidths with two types of SSDs</a:t>
+            </a:r>
+            <a:endParaRPr lang="en-US" dirty="0"/>
+          </a:p>
+        </p:txBody>
+      </p:sp>
+    </p:spTree>
+    <p:extLst>
+      <p:ext uri="{BB962C8B-B14F-4D97-AF65-F5344CB8AC3E}">
+        <p14:creationId xmlns:p14="http://schemas.microsoft.com/office/powerpoint/2010/main" val="1744524914"/>
+      </p:ext>
+    </p:extLst>
+  </p:cSld>
+  <p:clrMapOvr>
+    <a:masterClrMapping/>
+  </p:clrMapOvr>
+  <p:timing>
+    <p:tnLst>
+      <p:par>
+        <p:cTn xmlns:p14="http://schemas.microsoft.com/office/powerpoint/2010/main" id="1" dur="indefinite" restart="never" nodeType="tmRoot"/>
+      </p:par>
+    </p:tnLst>
+  </p:timing>
+</p:sld>
+</file>
+
+<file path=ppt/slides/slide7.xml><?xml version="1.0" encoding="utf-8"?>
+<p:sld xmlns:a="http://schemas.openxmlformats.org/drawingml/2006/main" xmlns:r="http://schemas.openxmlformats.org/officeDocument/2006/relationships" xmlns:p="http://schemas.openxmlformats.org/presentationml/2006/main">
+  <p:cSld>
+    <p:spTree>
+      <p:nvGrpSpPr>
+        <p:cNvPr id="1" name=""/>
+        <p:cNvGrpSpPr/>
+        <p:nvPr/>
+      </p:nvGrpSpPr>
+      <p:grpSpPr>
+        <a:xfrm>
+          <a:off x="0" y="0"/>
+          <a:ext cx="0" cy="0"/>
+          <a:chOff x="0" y="0"/>
+          <a:chExt cx="0" cy="0"/>
+        </a:xfrm>
+      </p:grpSpPr>
+      <p:sp>
+        <p:nvSpPr>
+          <p:cNvPr id="7" name="TextBox 6"/>
+          <p:cNvSpPr txBox="1"/>
+          <p:nvPr/>
+        </p:nvSpPr>
+        <p:spPr>
+          <a:xfrm>
+            <a:off x="128046" y="302842"/>
+            <a:ext cx="3414404" cy="553998"/>
+          </a:xfrm>
+          <a:prstGeom prst="rect">
+            <a:avLst/>
+          </a:prstGeom>
+          <a:noFill/>
+        </p:spPr>
+        <p:txBody>
+          <a:bodyPr wrap="none" rtlCol="0">
+            <a:spAutoFit/>
+          </a:bodyPr>
+          <a:lstStyle/>
+          <a:p>
+            <a:r>
+              <a:rPr lang="en-US" sz="3000" b="1" dirty="0" smtClean="0"/>
+              <a:t>Big Data Benchmark</a:t>
+            </a:r>
+            <a:endParaRPr lang="en-US" sz="3000" b="1" dirty="0"/>
+          </a:p>
+        </p:txBody>
+      </p:sp>
+      <p:sp>
+        <p:nvSpPr>
+          <p:cNvPr id="3" name="TextBox 2"/>
+          <p:cNvSpPr txBox="1"/>
+          <p:nvPr/>
+        </p:nvSpPr>
+        <p:spPr>
+          <a:xfrm>
+            <a:off x="619688" y="1918821"/>
+            <a:ext cx="1176186" cy="369332"/>
+          </a:xfrm>
+          <a:prstGeom prst="rect">
+            <a:avLst/>
+          </a:prstGeom>
+          <a:noFill/>
+        </p:spPr>
+        <p:txBody>
+          <a:bodyPr wrap="none" rtlCol="0">
+            <a:spAutoFit/>
+          </a:bodyPr>
+          <a:lstStyle/>
+          <a:p>
+            <a:r>
+              <a:rPr lang="en-US" dirty="0" smtClean="0"/>
+              <a:t>Spark SQL, </a:t>
+            </a:r>
+            <a:endParaRPr lang="en-US" dirty="0"/>
+          </a:p>
+        </p:txBody>
+      </p:sp>
+    </p:spTree>
+    <p:extLst>
+      <p:ext uri="{BB962C8B-B14F-4D97-AF65-F5344CB8AC3E}">
+        <p14:creationId xmlns:p14="http://schemas.microsoft.com/office/powerpoint/2010/main" val="4105339425"/>
+      </p:ext>
+    </p:extLst>
+  </p:cSld>
+  <p:clrMapOvr>
+    <a:masterClrMapping/>
+  </p:clrMapOvr>
+  <p:timing>
+    <p:tnLst>
+      <p:par>
+        <p:cTn xmlns:p14="http://schemas.microsoft.com/office/powerpoint/2010/main" id="1" dur="indefinite" restart="never" nodeType="tmRoot"/>
+      </p:par>
+    </p:tnLst>
+  </p:timing>
+</p:sld>
+</file>
+
+<file path=ppt/slides/slide8.xml><?xml version="1.0" encoding="utf-8"?>
 <p:sld xmlns:a="http://schemas.openxmlformats.org/drawingml/2006/main" xmlns:r="http://schemas.openxmlformats.org/officeDocument/2006/relationships" xmlns:p="http://schemas.openxmlformats.org/presentationml/2006/main">
   <p:cSld>
     <p:spTree>
@@ -3921,6 +5324,73 @@
     <p:extLst>
       <p:ext uri="{BB962C8B-B14F-4D97-AF65-F5344CB8AC3E}">
         <p14:creationId xmlns:p14="http://schemas.microsoft.com/office/powerpoint/2010/main" val="2903384716"/>
+      </p:ext>
+    </p:extLst>
+  </p:cSld>
+  <p:clrMapOvr>
+    <a:masterClrMapping/>
+  </p:clrMapOvr>
+  <p:timing>
+    <p:tnLst>
+      <p:par>
+        <p:cTn xmlns:p14="http://schemas.microsoft.com/office/powerpoint/2010/main" id="1" dur="indefinite" restart="never" nodeType="tmRoot"/>
+      </p:par>
+    </p:tnLst>
+  </p:timing>
+</p:sld>
+</file>
+
+<file path=ppt/slides/slide9.xml><?xml version="1.0" encoding="utf-8"?>
+<p:sld xmlns:a="http://schemas.openxmlformats.org/drawingml/2006/main" xmlns:r="http://schemas.openxmlformats.org/officeDocument/2006/relationships" xmlns:p="http://schemas.openxmlformats.org/presentationml/2006/main">
+  <p:cSld>
+    <p:spTree>
+      <p:nvGrpSpPr>
+        <p:cNvPr id="1" name=""/>
+        <p:cNvGrpSpPr/>
+        <p:nvPr/>
+      </p:nvGrpSpPr>
+      <p:grpSpPr>
+        <a:xfrm>
+          <a:off x="0" y="0"/>
+          <a:ext cx="0" cy="0"/>
+          <a:chOff x="0" y="0"/>
+          <a:chExt cx="0" cy="0"/>
+        </a:xfrm>
+      </p:grpSpPr>
+      <p:sp>
+        <p:nvSpPr>
+          <p:cNvPr id="7" name="TextBox 6"/>
+          <p:cNvSpPr txBox="1"/>
+          <p:nvPr/>
+        </p:nvSpPr>
+        <p:spPr>
+          <a:xfrm>
+            <a:off x="322431" y="302842"/>
+            <a:ext cx="1857299" cy="553998"/>
+          </a:xfrm>
+          <a:prstGeom prst="rect">
+            <a:avLst/>
+          </a:prstGeom>
+          <a:noFill/>
+        </p:spPr>
+        <p:txBody>
+          <a:bodyPr wrap="none" rtlCol="0">
+            <a:spAutoFit/>
+          </a:bodyPr>
+          <a:lstStyle/>
+          <a:p>
+            <a:r>
+              <a:rPr lang="en-US" sz="3000" b="1" dirty="0" smtClean="0"/>
+              <a:t>Discussion</a:t>
+            </a:r>
+            <a:endParaRPr lang="en-US" sz="3000" b="1" dirty="0"/>
+          </a:p>
+        </p:txBody>
+      </p:sp>
+    </p:spTree>
+    <p:extLst>
+      <p:ext uri="{BB962C8B-B14F-4D97-AF65-F5344CB8AC3E}">
+        <p14:creationId xmlns:p14="http://schemas.microsoft.com/office/powerpoint/2010/main" val="2235642426"/>
       </p:ext>
     </p:extLst>
   </p:cSld>
@@ -4255,4 +5725,324 @@
   </a:objectDefaults>
   <a:extraClrSchemeLst/>
 </a:theme>
+</file>
+
+<file path=ppt/theme/theme2.xml><?xml version="1.0" encoding="utf-8"?>
+<a:theme xmlns:a="http://schemas.openxmlformats.org/drawingml/2006/main" name="Office Theme">
+  <a:themeElements>
+    <a:clrScheme name="Office">
+      <a:dk1>
+        <a:sysClr val="windowText" lastClr="000000"/>
+      </a:dk1>
+      <a:lt1>
+        <a:sysClr val="window" lastClr="FFFFFF"/>
+      </a:lt1>
+      <a:dk2>
+        <a:srgbClr val="1F497D"/>
+      </a:dk2>
+      <a:lt2>
+        <a:srgbClr val="EEECE1"/>
+      </a:lt2>
+      <a:accent1>
+        <a:srgbClr val="4F81BD"/>
+      </a:accent1>
+      <a:accent2>
+        <a:srgbClr val="C0504D"/>
+      </a:accent2>
+      <a:accent3>
+        <a:srgbClr val="9BBB59"/>
+      </a:accent3>
+      <a:accent4>
+        <a:srgbClr val="8064A2"/>
+      </a:accent4>
+      <a:accent5>
+        <a:srgbClr val="4BACC6"/>
+      </a:accent5>
+      <a:accent6>
+        <a:srgbClr val="F79646"/>
+      </a:accent6>
+      <a:hlink>
+        <a:srgbClr val="0000FF"/>
+      </a:hlink>
+      <a:folHlink>
+        <a:srgbClr val="800080"/>
+      </a:folHlink>
+    </a:clrScheme>
+    <a:fontScheme name="Office">
+      <a:majorFont>
+        <a:latin typeface="Calibri"/>
+        <a:ea typeface=""/>
+        <a:cs typeface=""/>
+        <a:font script="Jpan" typeface="ＭＳ Ｐゴシック"/>
+        <a:font script="Hang" typeface="맑은 고딕"/>
+        <a:font script="Hans" typeface="宋体"/>
+        <a:font script="Hant" typeface="新細明體"/>
+        <a:font script="Arab" typeface="Times New Roman"/>
+        <a:font script="Hebr" typeface="Times New Roman"/>
+        <a:font script="Thai" typeface="Angsana New"/>
+        <a:font script="Ethi" typeface="Nyala"/>
+        <a:font script="Beng" typeface="Vrinda"/>
+        <a:font script="Gujr" typeface="Shruti"/>
+        <a:font script="Khmr" typeface="MoolBoran"/>
+        <a:font script="Knda" typeface="Tunga"/>
+        <a:font script="Guru" typeface="Raavi"/>
+        <a:font script="Cans" typeface="Euphemia"/>
+        <a:font script="Cher" typeface="Plantagenet Cherokee"/>
+        <a:font script="Yiii" typeface="Microsoft Yi Baiti"/>
+        <a:font script="Tibt" typeface="Microsoft Himalaya"/>
+        <a:font script="Thaa" typeface="MV Boli"/>
+        <a:font script="Deva" typeface="Mangal"/>
+        <a:font script="Telu" typeface="Gautami"/>
+        <a:font script="Taml" typeface="Latha"/>
+        <a:font script="Syrc" typeface="Estrangelo Edessa"/>
+        <a:font script="Orya" typeface="Kalinga"/>
+        <a:font script="Mlym" typeface="Kartika"/>
+        <a:font script="Laoo" typeface="DokChampa"/>
+        <a:font script="Sinh" typeface="Iskoola Pota"/>
+        <a:font script="Mong" typeface="Mongolian Baiti"/>
+        <a:font script="Viet" typeface="Times New Roman"/>
+        <a:font script="Uigh" typeface="Microsoft Uighur"/>
+        <a:font script="Geor" typeface="Sylfaen"/>
+      </a:majorFont>
+      <a:minorFont>
+        <a:latin typeface="Calibri"/>
+        <a:ea typeface=""/>
+        <a:cs typeface=""/>
+        <a:font script="Jpan" typeface="ＭＳ Ｐゴシック"/>
+        <a:font script="Hang" typeface="맑은 고딕"/>
+        <a:font script="Hans" typeface="宋体"/>
+        <a:font script="Hant" typeface="新細明體"/>
+        <a:font script="Arab" typeface="Arial"/>
+        <a:font script="Hebr" typeface="Arial"/>
+        <a:font script="Thai" typeface="Cordia New"/>
+        <a:font script="Ethi" typeface="Nyala"/>
+        <a:font script="Beng" typeface="Vrinda"/>
+        <a:font script="Gujr" typeface="Shruti"/>
+        <a:font script="Khmr" typeface="DaunPenh"/>
+        <a:font script="Knda" typeface="Tunga"/>
+        <a:font script="Guru" typeface="Raavi"/>
+        <a:font script="Cans" typeface="Euphemia"/>
+        <a:font script="Cher" typeface="Plantagenet Cherokee"/>
+        <a:font script="Yiii" typeface="Microsoft Yi Baiti"/>
+        <a:font script="Tibt" typeface="Microsoft Himalaya"/>
+        <a:font script="Thaa" typeface="MV Boli"/>
+        <a:font script="Deva" typeface="Mangal"/>
+        <a:font script="Telu" typeface="Gautami"/>
+        <a:font script="Taml" typeface="Latha"/>
+        <a:font script="Syrc" typeface="Estrangelo Edessa"/>
+        <a:font script="Orya" typeface="Kalinga"/>
+        <a:font script="Mlym" typeface="Kartika"/>
+        <a:font script="Laoo" typeface="DokChampa"/>
+        <a:font script="Sinh" typeface="Iskoola Pota"/>
+        <a:font script="Mong" typeface="Mongolian Baiti"/>
+        <a:font script="Viet" typeface="Arial"/>
+        <a:font script="Uigh" typeface="Microsoft Uighur"/>
+        <a:font script="Geor" typeface="Sylfaen"/>
+      </a:minorFont>
+    </a:fontScheme>
+    <a:fmtScheme name="Office">
+      <a:fillStyleLst>
+        <a:solidFill>
+          <a:schemeClr val="phClr"/>
+        </a:solidFill>
+        <a:gradFill rotWithShape="1">
+          <a:gsLst>
+            <a:gs pos="0">
+              <a:schemeClr val="phClr">
+                <a:tint val="50000"/>
+                <a:satMod val="300000"/>
+              </a:schemeClr>
+            </a:gs>
+            <a:gs pos="35000">
+              <a:schemeClr val="phClr">
+                <a:tint val="37000"/>
+                <a:satMod val="300000"/>
+              </a:schemeClr>
+            </a:gs>
+            <a:gs pos="100000">
+              <a:schemeClr val="phClr">
+                <a:tint val="15000"/>
+                <a:satMod val="350000"/>
+              </a:schemeClr>
+            </a:gs>
+          </a:gsLst>
+          <a:lin ang="16200000" scaled="1"/>
+        </a:gradFill>
+        <a:gradFill rotWithShape="1">
+          <a:gsLst>
+            <a:gs pos="0">
+              <a:schemeClr val="phClr">
+                <a:tint val="100000"/>
+                <a:shade val="100000"/>
+                <a:satMod val="130000"/>
+              </a:schemeClr>
+            </a:gs>
+            <a:gs pos="100000">
+              <a:schemeClr val="phClr">
+                <a:tint val="50000"/>
+                <a:shade val="100000"/>
+                <a:satMod val="350000"/>
+              </a:schemeClr>
+            </a:gs>
+          </a:gsLst>
+          <a:lin ang="16200000" scaled="0"/>
+        </a:gradFill>
+      </a:fillStyleLst>
+      <a:lnStyleLst>
+        <a:ln w="9525" cap="flat" cmpd="sng" algn="ctr">
+          <a:solidFill>
+            <a:schemeClr val="phClr">
+              <a:shade val="95000"/>
+              <a:satMod val="105000"/>
+            </a:schemeClr>
+          </a:solidFill>
+          <a:prstDash val="solid"/>
+        </a:ln>
+        <a:ln w="25400" cap="flat" cmpd="sng" algn="ctr">
+          <a:solidFill>
+            <a:schemeClr val="phClr"/>
+          </a:solidFill>
+          <a:prstDash val="solid"/>
+        </a:ln>
+        <a:ln w="38100" cap="flat" cmpd="sng" algn="ctr">
+          <a:solidFill>
+            <a:schemeClr val="phClr"/>
+          </a:solidFill>
+          <a:prstDash val="solid"/>
+        </a:ln>
+      </a:lnStyleLst>
+      <a:effectStyleLst>
+        <a:effectStyle>
+          <a:effectLst>
+            <a:outerShdw blurRad="40000" dist="20000" dir="5400000" rotWithShape="0">
+              <a:srgbClr val="000000">
+                <a:alpha val="38000"/>
+              </a:srgbClr>
+            </a:outerShdw>
+          </a:effectLst>
+        </a:effectStyle>
+        <a:effectStyle>
+          <a:effectLst>
+            <a:outerShdw blurRad="40000" dist="23000" dir="5400000" rotWithShape="0">
+              <a:srgbClr val="000000">
+                <a:alpha val="35000"/>
+              </a:srgbClr>
+            </a:outerShdw>
+          </a:effectLst>
+        </a:effectStyle>
+        <a:effectStyle>
+          <a:effectLst>
+            <a:outerShdw blurRad="40000" dist="23000" dir="5400000" rotWithShape="0">
+              <a:srgbClr val="000000">
+                <a:alpha val="35000"/>
+              </a:srgbClr>
+            </a:outerShdw>
+          </a:effectLst>
+          <a:scene3d>
+            <a:camera prst="orthographicFront">
+              <a:rot lat="0" lon="0" rev="0"/>
+            </a:camera>
+            <a:lightRig rig="threePt" dir="t">
+              <a:rot lat="0" lon="0" rev="1200000"/>
+            </a:lightRig>
+          </a:scene3d>
+          <a:sp3d>
+            <a:bevelT w="63500" h="25400"/>
+          </a:sp3d>
+        </a:effectStyle>
+      </a:effectStyleLst>
+      <a:bgFillStyleLst>
+        <a:solidFill>
+          <a:schemeClr val="phClr"/>
+        </a:solidFill>
+        <a:gradFill rotWithShape="1">
+          <a:gsLst>
+            <a:gs pos="0">
+              <a:schemeClr val="phClr">
+                <a:tint val="40000"/>
+                <a:satMod val="350000"/>
+              </a:schemeClr>
+            </a:gs>
+            <a:gs pos="40000">
+              <a:schemeClr val="phClr">
+                <a:tint val="45000"/>
+                <a:shade val="99000"/>
+                <a:satMod val="350000"/>
+              </a:schemeClr>
+            </a:gs>
+            <a:gs pos="100000">
+              <a:schemeClr val="phClr">
+                <a:shade val="20000"/>
+                <a:satMod val="255000"/>
+              </a:schemeClr>
+            </a:gs>
+          </a:gsLst>
+          <a:path path="circle">
+            <a:fillToRect l="50000" t="-80000" r="50000" b="180000"/>
+          </a:path>
+        </a:gradFill>
+        <a:gradFill rotWithShape="1">
+          <a:gsLst>
+            <a:gs pos="0">
+              <a:schemeClr val="phClr">
+                <a:tint val="80000"/>
+                <a:satMod val="300000"/>
+              </a:schemeClr>
+            </a:gs>
+            <a:gs pos="100000">
+              <a:schemeClr val="phClr">
+                <a:shade val="30000"/>
+                <a:satMod val="200000"/>
+              </a:schemeClr>
+            </a:gs>
+          </a:gsLst>
+          <a:path path="circle">
+            <a:fillToRect l="50000" t="50000" r="50000" b="50000"/>
+          </a:path>
+        </a:gradFill>
+      </a:bgFillStyleLst>
+    </a:fmtScheme>
+  </a:themeElements>
+  <a:objectDefaults>
+    <a:spDef>
+      <a:spPr/>
+      <a:bodyPr/>
+      <a:lstStyle/>
+      <a:style>
+        <a:lnRef idx="1">
+          <a:schemeClr val="accent1"/>
+        </a:lnRef>
+        <a:fillRef idx="3">
+          <a:schemeClr val="accent1"/>
+        </a:fillRef>
+        <a:effectRef idx="2">
+          <a:schemeClr val="accent1"/>
+        </a:effectRef>
+        <a:fontRef idx="minor">
+          <a:schemeClr val="lt1"/>
+        </a:fontRef>
+      </a:style>
+    </a:spDef>
+    <a:lnDef>
+      <a:spPr/>
+      <a:bodyPr/>
+      <a:lstStyle/>
+      <a:style>
+        <a:lnRef idx="2">
+          <a:schemeClr val="accent1"/>
+        </a:lnRef>
+        <a:fillRef idx="0">
+          <a:schemeClr val="accent1"/>
+        </a:fillRef>
+        <a:effectRef idx="1">
+          <a:schemeClr val="accent1"/>
+        </a:effectRef>
+        <a:fontRef idx="minor">
+          <a:schemeClr val="tx1"/>
+        </a:fontRef>
+      </a:style>
+    </a:lnDef>
+  </a:objectDefaults>
+  <a:extraClrSchemeLst/>
+</a:theme>
 </file>
</xml_diff>